<commit_message>
宮下 0617 14:24 更新
</commit_message>
<xml_diff>
--- a/doc/02_外部設計/外部設計_麻雀アプリ.pptx
+++ b/doc/02_外部設計/外部設計_麻雀アプリ.pptx
@@ -4529,7 +4529,7 @@
           <a:p>
             <a:fld id="{C0EB4879-403B-4763-87B3-9FFAC4021DF4}" type="datetimeFigureOut">
               <a:rPr kumimoji="1" lang="ja-JP" altLang="en-US" smtClean="0"/>
-              <a:t>2024/6/13</a:t>
+              <a:t>2024/6/17</a:t>
             </a:fld>
             <a:endParaRPr kumimoji="1" lang="ja-JP" altLang="en-US"/>
           </a:p>
@@ -6454,7 +6454,7 @@
           <a:p>
             <a:fld id="{A45557B2-FB0A-404C-A865-8BCD55AA15D9}" type="datetimeFigureOut">
               <a:rPr kumimoji="1" lang="ja-JP" altLang="en-US" smtClean="0"/>
-              <a:t>2024/6/13</a:t>
+              <a:t>2024/6/17</a:t>
             </a:fld>
             <a:endParaRPr kumimoji="1" lang="ja-JP" altLang="en-US"/>
           </a:p>
@@ -6684,7 +6684,7 @@
           <a:p>
             <a:fld id="{A45557B2-FB0A-404C-A865-8BCD55AA15D9}" type="datetimeFigureOut">
               <a:rPr kumimoji="1" lang="ja-JP" altLang="en-US" smtClean="0"/>
-              <a:t>2024/6/13</a:t>
+              <a:t>2024/6/17</a:t>
             </a:fld>
             <a:endParaRPr kumimoji="1" lang="ja-JP" altLang="en-US"/>
           </a:p>
@@ -6924,7 +6924,7 @@
           <a:p>
             <a:fld id="{A45557B2-FB0A-404C-A865-8BCD55AA15D9}" type="datetimeFigureOut">
               <a:rPr kumimoji="1" lang="ja-JP" altLang="en-US" smtClean="0"/>
-              <a:t>2024/6/13</a:t>
+              <a:t>2024/6/17</a:t>
             </a:fld>
             <a:endParaRPr kumimoji="1" lang="ja-JP" altLang="en-US"/>
           </a:p>
@@ -7154,7 +7154,7 @@
           <a:p>
             <a:fld id="{A45557B2-FB0A-404C-A865-8BCD55AA15D9}" type="datetimeFigureOut">
               <a:rPr kumimoji="1" lang="ja-JP" altLang="en-US" smtClean="0"/>
-              <a:t>2024/6/13</a:t>
+              <a:t>2024/6/17</a:t>
             </a:fld>
             <a:endParaRPr kumimoji="1" lang="ja-JP" altLang="en-US"/>
           </a:p>
@@ -7429,7 +7429,7 @@
           <a:p>
             <a:fld id="{A45557B2-FB0A-404C-A865-8BCD55AA15D9}" type="datetimeFigureOut">
               <a:rPr kumimoji="1" lang="ja-JP" altLang="en-US" smtClean="0"/>
-              <a:t>2024/6/13</a:t>
+              <a:t>2024/6/17</a:t>
             </a:fld>
             <a:endParaRPr kumimoji="1" lang="ja-JP" altLang="en-US"/>
           </a:p>
@@ -7758,7 +7758,7 @@
           <a:p>
             <a:fld id="{A45557B2-FB0A-404C-A865-8BCD55AA15D9}" type="datetimeFigureOut">
               <a:rPr kumimoji="1" lang="ja-JP" altLang="en-US" smtClean="0"/>
-              <a:t>2024/6/13</a:t>
+              <a:t>2024/6/17</a:t>
             </a:fld>
             <a:endParaRPr kumimoji="1" lang="ja-JP" altLang="en-US"/>
           </a:p>
@@ -8234,7 +8234,7 @@
           <a:p>
             <a:fld id="{A45557B2-FB0A-404C-A865-8BCD55AA15D9}" type="datetimeFigureOut">
               <a:rPr kumimoji="1" lang="ja-JP" altLang="en-US" smtClean="0"/>
-              <a:t>2024/6/13</a:t>
+              <a:t>2024/6/17</a:t>
             </a:fld>
             <a:endParaRPr kumimoji="1" lang="ja-JP" altLang="en-US"/>
           </a:p>
@@ -8375,7 +8375,7 @@
           <a:p>
             <a:fld id="{A45557B2-FB0A-404C-A865-8BCD55AA15D9}" type="datetimeFigureOut">
               <a:rPr kumimoji="1" lang="ja-JP" altLang="en-US" smtClean="0"/>
-              <a:t>2024/6/13</a:t>
+              <a:t>2024/6/17</a:t>
             </a:fld>
             <a:endParaRPr kumimoji="1" lang="ja-JP" altLang="en-US"/>
           </a:p>
@@ -8488,7 +8488,7 @@
           <a:p>
             <a:fld id="{A45557B2-FB0A-404C-A865-8BCD55AA15D9}" type="datetimeFigureOut">
               <a:rPr kumimoji="1" lang="ja-JP" altLang="en-US" smtClean="0"/>
-              <a:t>2024/6/13</a:t>
+              <a:t>2024/6/17</a:t>
             </a:fld>
             <a:endParaRPr kumimoji="1" lang="ja-JP" altLang="en-US"/>
           </a:p>
@@ -8831,7 +8831,7 @@
           <a:p>
             <a:fld id="{A45557B2-FB0A-404C-A865-8BCD55AA15D9}" type="datetimeFigureOut">
               <a:rPr kumimoji="1" lang="ja-JP" altLang="en-US" smtClean="0"/>
-              <a:t>2024/6/13</a:t>
+              <a:t>2024/6/17</a:t>
             </a:fld>
             <a:endParaRPr kumimoji="1" lang="ja-JP" altLang="en-US"/>
           </a:p>
@@ -9119,7 +9119,7 @@
           <a:p>
             <a:fld id="{A45557B2-FB0A-404C-A865-8BCD55AA15D9}" type="datetimeFigureOut">
               <a:rPr kumimoji="1" lang="ja-JP" altLang="en-US" smtClean="0"/>
-              <a:t>2024/6/13</a:t>
+              <a:t>2024/6/17</a:t>
             </a:fld>
             <a:endParaRPr kumimoji="1" lang="ja-JP" altLang="en-US"/>
           </a:p>
@@ -9392,7 +9392,7 @@
           <a:p>
             <a:fld id="{A45557B2-FB0A-404C-A865-8BCD55AA15D9}" type="datetimeFigureOut">
               <a:rPr kumimoji="1" lang="ja-JP" altLang="en-US" smtClean="0"/>
-              <a:t>2024/6/13</a:t>
+              <a:t>2024/6/17</a:t>
             </a:fld>
             <a:endParaRPr kumimoji="1" lang="ja-JP" altLang="en-US"/>
           </a:p>
@@ -11807,6 +11807,420 @@
           </a:p>
         </p:txBody>
       </p:sp>
+      <p:grpSp>
+        <p:nvGrpSpPr>
+          <p:cNvPr id="40" name="グループ化 39">
+            <a:extLst>
+              <a:ext uri="{FF2B5EF4-FFF2-40B4-BE49-F238E27FC236}">
+                <a16:creationId xmlns:a16="http://schemas.microsoft.com/office/drawing/2014/main" id="{24301C83-698A-F5AD-B683-CD63843BF3BB}"/>
+              </a:ext>
+            </a:extLst>
+          </p:cNvPr>
+          <p:cNvGrpSpPr/>
+          <p:nvPr/>
+        </p:nvGrpSpPr>
+        <p:grpSpPr>
+          <a:xfrm>
+            <a:off x="7737783" y="2053478"/>
+            <a:ext cx="3859403" cy="2253937"/>
+            <a:chOff x="7737783" y="2053478"/>
+            <a:chExt cx="3859403" cy="2253937"/>
+          </a:xfrm>
+        </p:grpSpPr>
+        <p:grpSp>
+          <p:nvGrpSpPr>
+            <p:cNvPr id="16" name="グループ化 15">
+              <a:extLst>
+                <a:ext uri="{FF2B5EF4-FFF2-40B4-BE49-F238E27FC236}">
+                  <a16:creationId xmlns:a16="http://schemas.microsoft.com/office/drawing/2014/main" id="{306A2D00-3228-04D1-F872-11D4C7334E85}"/>
+                </a:ext>
+              </a:extLst>
+            </p:cNvPr>
+            <p:cNvGrpSpPr/>
+            <p:nvPr/>
+          </p:nvGrpSpPr>
+          <p:grpSpPr>
+            <a:xfrm>
+              <a:off x="7737783" y="2053478"/>
+              <a:ext cx="3859403" cy="2253937"/>
+              <a:chOff x="4768672" y="1014152"/>
+              <a:chExt cx="3269158" cy="2253937"/>
+            </a:xfrm>
+            <a:solidFill>
+              <a:schemeClr val="bg1"/>
+            </a:solidFill>
+          </p:grpSpPr>
+          <p:grpSp>
+            <p:nvGrpSpPr>
+              <p:cNvPr id="17" name="グループ化 16">
+                <a:extLst>
+                  <a:ext uri="{FF2B5EF4-FFF2-40B4-BE49-F238E27FC236}">
+                    <a16:creationId xmlns:a16="http://schemas.microsoft.com/office/drawing/2014/main" id="{B4E401C2-E723-D887-6487-A25742B1D721}"/>
+                  </a:ext>
+                </a:extLst>
+              </p:cNvPr>
+              <p:cNvGrpSpPr/>
+              <p:nvPr/>
+            </p:nvGrpSpPr>
+            <p:grpSpPr>
+              <a:xfrm>
+                <a:off x="4768672" y="1014152"/>
+                <a:ext cx="3269158" cy="2253937"/>
+                <a:chOff x="4768672" y="1014152"/>
+                <a:chExt cx="3269158" cy="2253937"/>
+              </a:xfrm>
+              <a:grpFill/>
+            </p:grpSpPr>
+            <p:sp>
+              <p:nvSpPr>
+                <p:cNvPr id="19" name="四角形: 角を丸くする 18">
+                  <a:extLst>
+                    <a:ext uri="{FF2B5EF4-FFF2-40B4-BE49-F238E27FC236}">
+                      <a16:creationId xmlns:a16="http://schemas.microsoft.com/office/drawing/2014/main" id="{9D22BC62-B423-6159-9885-9FB9FAD167AE}"/>
+                    </a:ext>
+                  </a:extLst>
+                </p:cNvPr>
+                <p:cNvSpPr/>
+                <p:nvPr/>
+              </p:nvSpPr>
+              <p:spPr>
+                <a:xfrm>
+                  <a:off x="4768672" y="1014152"/>
+                  <a:ext cx="3269158" cy="2253937"/>
+                </a:xfrm>
+                <a:prstGeom prst="roundRect">
+                  <a:avLst/>
+                </a:prstGeom>
+                <a:grpFill/>
+                <a:ln w="76200">
+                  <a:solidFill>
+                    <a:srgbClr val="FF6633"/>
+                  </a:solidFill>
+                </a:ln>
+              </p:spPr>
+              <p:style>
+                <a:lnRef idx="2">
+                  <a:schemeClr val="accent1">
+                    <a:shade val="15000"/>
+                  </a:schemeClr>
+                </a:lnRef>
+                <a:fillRef idx="1">
+                  <a:schemeClr val="accent1"/>
+                </a:fillRef>
+                <a:effectRef idx="0">
+                  <a:schemeClr val="accent1"/>
+                </a:effectRef>
+                <a:fontRef idx="minor">
+                  <a:schemeClr val="lt1"/>
+                </a:fontRef>
+              </p:style>
+              <p:txBody>
+                <a:bodyPr rtlCol="0" anchor="ctr"/>
+                <a:lstStyle/>
+                <a:p>
+                  <a:pPr algn="ctr"/>
+                  <a:endParaRPr kumimoji="1" lang="ja-JP" altLang="en-US"/>
+                </a:p>
+              </p:txBody>
+            </p:sp>
+            <p:sp>
+              <p:nvSpPr>
+                <p:cNvPr id="32" name="テキスト ボックス 31">
+                  <a:extLst>
+                    <a:ext uri="{FF2B5EF4-FFF2-40B4-BE49-F238E27FC236}">
+                      <a16:creationId xmlns:a16="http://schemas.microsoft.com/office/drawing/2014/main" id="{6C273BC2-2F3C-D7EC-730F-AB70CCD239E5}"/>
+                    </a:ext>
+                  </a:extLst>
+                </p:cNvPr>
+                <p:cNvSpPr txBox="1"/>
+                <p:nvPr/>
+              </p:nvSpPr>
+              <p:spPr>
+                <a:xfrm>
+                  <a:off x="4907248" y="1231620"/>
+                  <a:ext cx="2988964" cy="369332"/>
+                </a:xfrm>
+                <a:prstGeom prst="rect">
+                  <a:avLst/>
+                </a:prstGeom>
+                <a:grpFill/>
+              </p:spPr>
+              <p:txBody>
+                <a:bodyPr wrap="square" rtlCol="0">
+                  <a:spAutoFit/>
+                </a:bodyPr>
+                <a:lstStyle/>
+                <a:p>
+                  <a:r>
+                    <a:rPr lang="ja-JP" altLang="en-US" dirty="0"/>
+                    <a:t>裏ドラ表示牌</a:t>
+                  </a:r>
+                  <a:r>
+                    <a:rPr kumimoji="1" lang="ja-JP" altLang="en-US" dirty="0"/>
+                    <a:t>を選んでください</a:t>
+                  </a:r>
+                </a:p>
+              </p:txBody>
+            </p:sp>
+          </p:grpSp>
+          <p:sp>
+            <p:nvSpPr>
+              <p:cNvPr id="18" name="四角形: 角を丸くする 17">
+                <a:extLst>
+                  <a:ext uri="{FF2B5EF4-FFF2-40B4-BE49-F238E27FC236}">
+                    <a16:creationId xmlns:a16="http://schemas.microsoft.com/office/drawing/2014/main" id="{FBEC9293-5598-2E03-BDD5-A56BA6F25615}"/>
+                  </a:ext>
+                </a:extLst>
+              </p:cNvPr>
+              <p:cNvSpPr/>
+              <p:nvPr/>
+            </p:nvSpPr>
+            <p:spPr>
+              <a:xfrm>
+                <a:off x="6993552" y="2577789"/>
+                <a:ext cx="727309" cy="369332"/>
+              </a:xfrm>
+              <a:prstGeom prst="roundRect">
+                <a:avLst/>
+              </a:prstGeom>
+              <a:grpFill/>
+              <a:ln w="38100">
+                <a:solidFill>
+                  <a:srgbClr val="FF6633"/>
+                </a:solidFill>
+              </a:ln>
+            </p:spPr>
+            <p:style>
+              <a:lnRef idx="2">
+                <a:schemeClr val="accent1">
+                  <a:shade val="15000"/>
+                </a:schemeClr>
+              </a:lnRef>
+              <a:fillRef idx="1">
+                <a:schemeClr val="accent1"/>
+              </a:fillRef>
+              <a:effectRef idx="0">
+                <a:schemeClr val="accent1"/>
+              </a:effectRef>
+              <a:fontRef idx="minor">
+                <a:schemeClr val="lt1"/>
+              </a:fontRef>
+            </p:style>
+            <p:txBody>
+              <a:bodyPr rtlCol="0" anchor="ctr"/>
+              <a:lstStyle/>
+              <a:p>
+                <a:pPr algn="ctr"/>
+                <a:r>
+                  <a:rPr kumimoji="1" lang="ja-JP" altLang="en-US">
+                    <a:solidFill>
+                      <a:schemeClr val="tx1"/>
+                    </a:solidFill>
+                  </a:rPr>
+                  <a:t>決定</a:t>
+                </a:r>
+              </a:p>
+            </p:txBody>
+          </p:sp>
+        </p:grpSp>
+        <p:sp>
+          <p:nvSpPr>
+            <p:cNvPr id="35" name="四角形: 角を丸くする 34">
+              <a:extLst>
+                <a:ext uri="{FF2B5EF4-FFF2-40B4-BE49-F238E27FC236}">
+                  <a16:creationId xmlns:a16="http://schemas.microsoft.com/office/drawing/2014/main" id="{B26B37E9-FF73-561C-6B03-4556040DB109}"/>
+                </a:ext>
+              </a:extLst>
+            </p:cNvPr>
+            <p:cNvSpPr/>
+            <p:nvPr/>
+          </p:nvSpPr>
+          <p:spPr>
+            <a:xfrm>
+              <a:off x="7978820" y="2656160"/>
+              <a:ext cx="609600" cy="816078"/>
+            </a:xfrm>
+            <a:prstGeom prst="roundRect">
+              <a:avLst/>
+            </a:prstGeom>
+            <a:solidFill>
+              <a:schemeClr val="bg1"/>
+            </a:solidFill>
+            <a:ln>
+              <a:solidFill>
+                <a:schemeClr val="tx1"/>
+              </a:solidFill>
+              <a:prstDash val="dash"/>
+            </a:ln>
+          </p:spPr>
+          <p:style>
+            <a:lnRef idx="2">
+              <a:schemeClr val="accent6"/>
+            </a:lnRef>
+            <a:fillRef idx="1">
+              <a:schemeClr val="lt1"/>
+            </a:fillRef>
+            <a:effectRef idx="0">
+              <a:schemeClr val="accent6"/>
+            </a:effectRef>
+            <a:fontRef idx="minor">
+              <a:schemeClr val="dk1"/>
+            </a:fontRef>
+          </p:style>
+          <p:txBody>
+            <a:bodyPr rtlCol="0" anchor="ctr"/>
+            <a:lstStyle/>
+            <a:p>
+              <a:pPr algn="ctr"/>
+              <a:endParaRPr kumimoji="1" lang="ja-JP" altLang="en-US"/>
+            </a:p>
+          </p:txBody>
+        </p:sp>
+        <p:pic>
+          <p:nvPicPr>
+            <p:cNvPr id="36" name="図 35" descr="文字の書かれた紙&#10;&#10;中程度の精度で自動的に生成された説明">
+              <a:extLst>
+                <a:ext uri="{FF2B5EF4-FFF2-40B4-BE49-F238E27FC236}">
+                  <a16:creationId xmlns:a16="http://schemas.microsoft.com/office/drawing/2014/main" id="{F4637C05-C5A9-8DFB-7B6E-957DC6C18C3B}"/>
+                </a:ext>
+              </a:extLst>
+            </p:cNvPr>
+            <p:cNvPicPr>
+              <a:picLocks noChangeAspect="1"/>
+            </p:cNvPicPr>
+            <p:nvPr/>
+          </p:nvPicPr>
+          <p:blipFill>
+            <a:blip r:embed="rId2">
+              <a:extLst>
+                <a:ext uri="{28A0092B-C50C-407E-A947-70E740481C1C}">
+                  <a14:useLocalDpi xmlns:a14="http://schemas.microsoft.com/office/drawing/2010/main" val="0"/>
+                </a:ext>
+              </a:extLst>
+            </a:blip>
+            <a:stretch>
+              <a:fillRect/>
+            </a:stretch>
+          </p:blipFill>
+          <p:spPr>
+            <a:xfrm>
+              <a:off x="8699229" y="2651742"/>
+              <a:ext cx="590632" cy="847843"/>
+            </a:xfrm>
+            <a:prstGeom prst="rect">
+              <a:avLst/>
+            </a:prstGeom>
+          </p:spPr>
+        </p:pic>
+        <p:pic>
+          <p:nvPicPr>
+            <p:cNvPr id="37" name="図 36" descr="文字の書かれた紙&#10;&#10;中程度の精度で自動的に生成された説明">
+              <a:extLst>
+                <a:ext uri="{FF2B5EF4-FFF2-40B4-BE49-F238E27FC236}">
+                  <a16:creationId xmlns:a16="http://schemas.microsoft.com/office/drawing/2014/main" id="{DFA21A3A-9C3C-28AD-C910-91D1EC75AB05}"/>
+                </a:ext>
+              </a:extLst>
+            </p:cNvPr>
+            <p:cNvPicPr>
+              <a:picLocks noChangeAspect="1"/>
+            </p:cNvPicPr>
+            <p:nvPr/>
+          </p:nvPicPr>
+          <p:blipFill>
+            <a:blip r:embed="rId2">
+              <a:extLst>
+                <a:ext uri="{28A0092B-C50C-407E-A947-70E740481C1C}">
+                  <a14:useLocalDpi xmlns:a14="http://schemas.microsoft.com/office/drawing/2010/main" val="0"/>
+                </a:ext>
+              </a:extLst>
+            </a:blip>
+            <a:stretch>
+              <a:fillRect/>
+            </a:stretch>
+          </p:blipFill>
+          <p:spPr>
+            <a:xfrm>
+              <a:off x="9361508" y="2642348"/>
+              <a:ext cx="590632" cy="847843"/>
+            </a:xfrm>
+            <a:prstGeom prst="rect">
+              <a:avLst/>
+            </a:prstGeom>
+          </p:spPr>
+        </p:pic>
+        <p:pic>
+          <p:nvPicPr>
+            <p:cNvPr id="38" name="図 37" descr="文字の書かれた紙&#10;&#10;中程度の精度で自動的に生成された説明">
+              <a:extLst>
+                <a:ext uri="{FF2B5EF4-FFF2-40B4-BE49-F238E27FC236}">
+                  <a16:creationId xmlns:a16="http://schemas.microsoft.com/office/drawing/2014/main" id="{64B8F1AB-C24E-BE58-2314-DE910CCF8910}"/>
+                </a:ext>
+              </a:extLst>
+            </p:cNvPr>
+            <p:cNvPicPr>
+              <a:picLocks noChangeAspect="1"/>
+            </p:cNvPicPr>
+            <p:nvPr/>
+          </p:nvPicPr>
+          <p:blipFill>
+            <a:blip r:embed="rId2">
+              <a:extLst>
+                <a:ext uri="{28A0092B-C50C-407E-A947-70E740481C1C}">
+                  <a14:useLocalDpi xmlns:a14="http://schemas.microsoft.com/office/drawing/2010/main" val="0"/>
+                </a:ext>
+              </a:extLst>
+            </a:blip>
+            <a:stretch>
+              <a:fillRect/>
+            </a:stretch>
+          </p:blipFill>
+          <p:spPr>
+            <a:xfrm>
+              <a:off x="10005875" y="2640278"/>
+              <a:ext cx="590632" cy="847843"/>
+            </a:xfrm>
+            <a:prstGeom prst="rect">
+              <a:avLst/>
+            </a:prstGeom>
+          </p:spPr>
+        </p:pic>
+        <p:pic>
+          <p:nvPicPr>
+            <p:cNvPr id="39" name="図 38" descr="文字の書かれた紙&#10;&#10;中程度の精度で自動的に生成された説明">
+              <a:extLst>
+                <a:ext uri="{FF2B5EF4-FFF2-40B4-BE49-F238E27FC236}">
+                  <a16:creationId xmlns:a16="http://schemas.microsoft.com/office/drawing/2014/main" id="{D80C34B7-CEE4-BA4C-0AF9-15D5F2DBA6C9}"/>
+                </a:ext>
+              </a:extLst>
+            </p:cNvPr>
+            <p:cNvPicPr>
+              <a:picLocks noChangeAspect="1"/>
+            </p:cNvPicPr>
+            <p:nvPr/>
+          </p:nvPicPr>
+          <p:blipFill>
+            <a:blip r:embed="rId2">
+              <a:extLst>
+                <a:ext uri="{28A0092B-C50C-407E-A947-70E740481C1C}">
+                  <a14:useLocalDpi xmlns:a14="http://schemas.microsoft.com/office/drawing/2010/main" val="0"/>
+                </a:ext>
+              </a:extLst>
+            </a:blip>
+            <a:stretch>
+              <a:fillRect/>
+            </a:stretch>
+          </p:blipFill>
+          <p:spPr>
+            <a:xfrm>
+              <a:off x="10650242" y="2642982"/>
+              <a:ext cx="590632" cy="847843"/>
+            </a:xfrm>
+            <a:prstGeom prst="rect">
+              <a:avLst/>
+            </a:prstGeom>
+          </p:spPr>
+        </p:pic>
+      </p:grpSp>
     </p:spTree>
     <p:extLst>
       <p:ext uri="{BB962C8B-B14F-4D97-AF65-F5344CB8AC3E}">
@@ -13335,8 +13749,8 @@
           </a:p>
         </p:txBody>
       </p:sp>
-      <mc:AlternateContent xmlns:mc="http://schemas.openxmlformats.org/markup-compatibility/2006">
-        <mc:Choice xmlns:p14="http://schemas.microsoft.com/office/powerpoint/2010/main" Requires="p14">
+      <mc:AlternateContent xmlns:mc="http://schemas.openxmlformats.org/markup-compatibility/2006" xmlns:p14="http://schemas.microsoft.com/office/powerpoint/2010/main">
+        <mc:Choice Requires="p14">
           <p:contentPart p14:bwMode="auto" r:id="rId10">
             <p14:nvContentPartPr>
               <p14:cNvPr id="65" name="インク 64">
@@ -13355,7 +13769,7 @@
             </p14:xfrm>
           </p:contentPart>
         </mc:Choice>
-        <mc:Fallback>
+        <mc:Fallback xmlns="">
           <p:pic>
             <p:nvPicPr>
               <p:cNvPr id="65" name="インク 64">
@@ -13386,8 +13800,8 @@
           </p:pic>
         </mc:Fallback>
       </mc:AlternateContent>
-      <mc:AlternateContent xmlns:mc="http://schemas.openxmlformats.org/markup-compatibility/2006">
-        <mc:Choice xmlns:p14="http://schemas.microsoft.com/office/powerpoint/2010/main" Requires="p14">
+      <mc:AlternateContent xmlns:mc="http://schemas.openxmlformats.org/markup-compatibility/2006" xmlns:p14="http://schemas.microsoft.com/office/powerpoint/2010/main">
+        <mc:Choice Requires="p14">
           <p:contentPart p14:bwMode="auto" r:id="rId12">
             <p14:nvContentPartPr>
               <p14:cNvPr id="67" name="インク 66">
@@ -13406,7 +13820,7 @@
             </p14:xfrm>
           </p:contentPart>
         </mc:Choice>
-        <mc:Fallback>
+        <mc:Fallback xmlns="">
           <p:pic>
             <p:nvPicPr>
               <p:cNvPr id="67" name="インク 66">
@@ -13437,8 +13851,8 @@
           </p:pic>
         </mc:Fallback>
       </mc:AlternateContent>
-      <mc:AlternateContent xmlns:mc="http://schemas.openxmlformats.org/markup-compatibility/2006">
-        <mc:Choice xmlns:p14="http://schemas.microsoft.com/office/powerpoint/2010/main" xmlns:aink="http://schemas.microsoft.com/office/drawing/2016/ink" Requires="p14 aink">
+      <mc:AlternateContent xmlns:mc="http://schemas.openxmlformats.org/markup-compatibility/2006" xmlns:p14="http://schemas.microsoft.com/office/powerpoint/2010/main" xmlns:aink="http://schemas.microsoft.com/office/drawing/2016/ink">
+        <mc:Choice Requires="p14 aink">
           <p:contentPart p14:bwMode="auto" r:id="rId14">
             <p14:nvContentPartPr>
               <p14:cNvPr id="87" name="インク 86">
@@ -13457,7 +13871,7 @@
             </p14:xfrm>
           </p:contentPart>
         </mc:Choice>
-        <mc:Fallback>
+        <mc:Fallback xmlns="">
           <p:pic>
             <p:nvPicPr>
               <p:cNvPr id="87" name="インク 86">
@@ -13488,8 +13902,8 @@
           </p:pic>
         </mc:Fallback>
       </mc:AlternateContent>
-      <mc:AlternateContent xmlns:mc="http://schemas.openxmlformats.org/markup-compatibility/2006">
-        <mc:Choice xmlns:p14="http://schemas.microsoft.com/office/powerpoint/2010/main" xmlns:aink="http://schemas.microsoft.com/office/drawing/2016/ink" Requires="p14 aink">
+      <mc:AlternateContent xmlns:mc="http://schemas.openxmlformats.org/markup-compatibility/2006" xmlns:p14="http://schemas.microsoft.com/office/powerpoint/2010/main" xmlns:aink="http://schemas.microsoft.com/office/drawing/2016/ink">
+        <mc:Choice Requires="p14 aink">
           <p:contentPart p14:bwMode="auto" r:id="rId16">
             <p14:nvContentPartPr>
               <p14:cNvPr id="100" name="インク 99">
@@ -13508,7 +13922,7 @@
             </p14:xfrm>
           </p:contentPart>
         </mc:Choice>
-        <mc:Fallback>
+        <mc:Fallback xmlns="">
           <p:pic>
             <p:nvPicPr>
               <p:cNvPr id="100" name="インク 99">
@@ -13539,8 +13953,8 @@
           </p:pic>
         </mc:Fallback>
       </mc:AlternateContent>
-      <mc:AlternateContent xmlns:mc="http://schemas.openxmlformats.org/markup-compatibility/2006">
-        <mc:Choice xmlns:p14="http://schemas.microsoft.com/office/powerpoint/2010/main" xmlns:aink="http://schemas.microsoft.com/office/drawing/2016/ink" Requires="p14 aink">
+      <mc:AlternateContent xmlns:mc="http://schemas.openxmlformats.org/markup-compatibility/2006" xmlns:p14="http://schemas.microsoft.com/office/powerpoint/2010/main" xmlns:aink="http://schemas.microsoft.com/office/drawing/2016/ink">
+        <mc:Choice Requires="p14 aink">
           <p:contentPart p14:bwMode="auto" r:id="rId18">
             <p14:nvContentPartPr>
               <p14:cNvPr id="102" name="インク 101">
@@ -13559,7 +13973,7 @@
             </p14:xfrm>
           </p:contentPart>
         </mc:Choice>
-        <mc:Fallback>
+        <mc:Fallback xmlns="">
           <p:pic>
             <p:nvPicPr>
               <p:cNvPr id="102" name="インク 101">
@@ -13590,8 +14004,8 @@
           </p:pic>
         </mc:Fallback>
       </mc:AlternateContent>
-      <mc:AlternateContent xmlns:mc="http://schemas.openxmlformats.org/markup-compatibility/2006">
-        <mc:Choice xmlns:p14="http://schemas.microsoft.com/office/powerpoint/2010/main" xmlns:aink="http://schemas.microsoft.com/office/drawing/2016/ink" Requires="p14 aink">
+      <mc:AlternateContent xmlns:mc="http://schemas.openxmlformats.org/markup-compatibility/2006" xmlns:p14="http://schemas.microsoft.com/office/powerpoint/2010/main" xmlns:aink="http://schemas.microsoft.com/office/drawing/2016/ink">
+        <mc:Choice Requires="p14 aink">
           <p:contentPart p14:bwMode="auto" r:id="rId20">
             <p14:nvContentPartPr>
               <p14:cNvPr id="105" name="インク 104">
@@ -13610,7 +14024,7 @@
             </p14:xfrm>
           </p:contentPart>
         </mc:Choice>
-        <mc:Fallback>
+        <mc:Fallback xmlns="">
           <p:pic>
             <p:nvPicPr>
               <p:cNvPr id="105" name="インク 104">
@@ -50864,20 +51278,20 @@
 </file>
 
 <file path=customXml/item1.xml><?xml version="1.0" encoding="utf-8"?>
-<p:properties xmlns:p="http://schemas.microsoft.com/office/2006/metadata/properties" xmlns:xsi="http://www.w3.org/2001/XMLSchema-instance" xmlns:pc="http://schemas.microsoft.com/office/infopath/2007/PartnerControls">
-  <documentManagement>
-    <_activity xmlns="87cf0ee8-fe20-4b5a-8adf-0a4439756175" xsi:nil="true"/>
-  </documentManagement>
-</p:properties>
-</file>
-
-<file path=customXml/item2.xml><?xml version="1.0" encoding="utf-8"?>
 <?mso-contentType ?>
 <FormTemplates xmlns="http://schemas.microsoft.com/sharepoint/v3/contenttype/forms">
   <Display>DocumentLibraryForm</Display>
   <Edit>DocumentLibraryForm</Edit>
   <New>DocumentLibraryForm</New>
 </FormTemplates>
+</file>
+
+<file path=customXml/item2.xml><?xml version="1.0" encoding="utf-8"?>
+<p:properties xmlns:p="http://schemas.microsoft.com/office/2006/metadata/properties" xmlns:xsi="http://www.w3.org/2001/XMLSchema-instance" xmlns:pc="http://schemas.microsoft.com/office/infopath/2007/PartnerControls">
+  <documentManagement>
+    <_activity xmlns="87cf0ee8-fe20-4b5a-8adf-0a4439756175" xsi:nil="true"/>
+  </documentManagement>
+</p:properties>
 </file>
 
 <file path=customXml/item3.xml><?xml version="1.0" encoding="utf-8"?>
@@ -51031,6 +51445,14 @@
 </file>
 
 <file path=customXml/itemProps1.xml><?xml version="1.0" encoding="utf-8"?>
+<ds:datastoreItem xmlns:ds="http://schemas.openxmlformats.org/officeDocument/2006/customXml" ds:itemID="{C8E97AB0-2E7B-4458-A3F7-BE7C257FBE03}">
+  <ds:schemaRefs>
+    <ds:schemaRef ds:uri="http://schemas.microsoft.com/sharepoint/v3/contenttype/forms"/>
+  </ds:schemaRefs>
+</ds:datastoreItem>
+</file>
+
+<file path=customXml/itemProps2.xml><?xml version="1.0" encoding="utf-8"?>
 <ds:datastoreItem xmlns:ds="http://schemas.openxmlformats.org/officeDocument/2006/customXml" ds:itemID="{67B23809-654E-4A73-8A19-A5D6FCDE32FC}">
   <ds:schemaRefs>
     <ds:schemaRef ds:uri="87cf0ee8-fe20-4b5a-8adf-0a4439756175"/>
@@ -51042,14 +51464,6 @@
     <ds:schemaRef ds:uri="http://schemas.microsoft.com/office/infopath/2007/PartnerControls"/>
     <ds:schemaRef ds:uri="http://schemas.openxmlformats.org/package/2006/metadata/core-properties"/>
     <ds:schemaRef ds:uri="http://www.w3.org/XML/1998/namespace"/>
-  </ds:schemaRefs>
-</ds:datastoreItem>
-</file>
-
-<file path=customXml/itemProps2.xml><?xml version="1.0" encoding="utf-8"?>
-<ds:datastoreItem xmlns:ds="http://schemas.openxmlformats.org/officeDocument/2006/customXml" ds:itemID="{C8E97AB0-2E7B-4458-A3F7-BE7C257FBE03}">
-  <ds:schemaRefs>
-    <ds:schemaRef ds:uri="http://schemas.microsoft.com/sharepoint/v3/contenttype/forms"/>
   </ds:schemaRefs>
 </ds:datastoreItem>
 </file>

</xml_diff>